<commit_message>
Made selection of control dependent on wether device supports motion sensing or not.
</commit_message>
<xml_diff>
--- a/qr/QRs.pptx
+++ b/qr/QRs.pptx
@@ -3144,8 +3144,8 @@
         </p:nvSpPr>
         <p:spPr>
           <a:xfrm>
-            <a:off x="2915816" y="4212377"/>
-            <a:ext cx="3240360" cy="584775"/>
+            <a:off x="1979712" y="4293096"/>
+            <a:ext cx="5184576" cy="584775"/>
           </a:xfrm>
           <a:prstGeom prst="rect">
             <a:avLst/>
@@ -3160,22 +3160,16 @@
           <a:p>
             <a:pPr algn="ctr"/>
             <a:r>
-              <a:rPr lang="de-AT" sz="3200" dirty="0" err="1">
+              <a:rPr lang="de-AT" sz="3200" dirty="0" smtClean="0">
                 <a:latin typeface="Helvetica" pitchFamily="34" charset="0"/>
               </a:rPr>
-              <a:t>e</a:t>
+              <a:t>schickling.me/</a:t>
             </a:r>
             <a:r>
               <a:rPr lang="de-AT" sz="3200" dirty="0" err="1" smtClean="0">
                 <a:latin typeface="Helvetica" pitchFamily="34" charset="0"/>
               </a:rPr>
-              <a:t>xplore</a:t>
-            </a:r>
-            <a:r>
-              <a:rPr lang="de-AT" sz="3200" dirty="0" smtClean="0">
-                <a:latin typeface="Helvetica" pitchFamily="34" charset="0"/>
-              </a:rPr>
-              <a:t>.</a:t>
+              <a:t>immersive</a:t>
             </a:r>
             <a:endParaRPr lang="de-AT" sz="3200" dirty="0">
               <a:latin typeface="Helvetica" pitchFamily="34" charset="0"/>
@@ -3206,7 +3200,7 @@
         </p:blipFill>
         <p:spPr bwMode="auto">
           <a:xfrm>
-            <a:off x="1260027" y="5455268"/>
+            <a:off x="1705505" y="5455268"/>
             <a:ext cx="1060973" cy="1060973"/>
           </a:xfrm>
           <a:prstGeom prst="rect">
@@ -3247,7 +3241,7 @@
         </p:blipFill>
         <p:spPr bwMode="auto">
           <a:xfrm>
-            <a:off x="2373722" y="5455268"/>
+            <a:off x="3264678" y="5455268"/>
             <a:ext cx="1060973" cy="1060973"/>
           </a:xfrm>
           <a:prstGeom prst="rect">
@@ -3288,48 +3282,7 @@
         </p:blipFill>
         <p:spPr bwMode="auto">
           <a:xfrm>
-            <a:off x="3487417" y="5455268"/>
-            <a:ext cx="1060973" cy="1060973"/>
-          </a:xfrm>
-          <a:prstGeom prst="rect">
-            <a:avLst/>
-          </a:prstGeom>
-          <a:noFill/>
-          <a:extLst>
-            <a:ext uri="{909E8E84-426E-40DD-AFC4-6F175D3DCCD1}">
-              <a14:hiddenFill xmlns:a14="http://schemas.microsoft.com/office/drawing/2010/main">
-                <a:solidFill>
-                  <a:srgbClr val="FFFFFF"/>
-                </a:solidFill>
-              </a14:hiddenFill>
-            </a:ext>
-          </a:extLst>
-        </p:spPr>
-      </p:pic>
-      <p:pic>
-        <p:nvPicPr>
-          <p:cNvPr id="1030" name="Picture 6" descr="C:\cygwin64\home\Emi\cardbord\room-tour\qr\belmorepark.png"/>
-          <p:cNvPicPr>
-            <a:picLocks noChangeAspect="1" noChangeArrowheads="1"/>
-          </p:cNvPicPr>
-          <p:nvPr/>
-        </p:nvPicPr>
-        <p:blipFill>
-          <a:blip r:embed="rId6">
-            <a:extLst>
-              <a:ext uri="{28A0092B-C50C-407E-A947-70E740481C1C}">
-                <a14:useLocalDpi xmlns:a14="http://schemas.microsoft.com/office/drawing/2010/main" val="0"/>
-              </a:ext>
-            </a:extLst>
-          </a:blip>
-          <a:srcRect/>
-          <a:stretch>
-            <a:fillRect/>
-          </a:stretch>
-        </p:blipFill>
-        <p:spPr bwMode="auto">
-          <a:xfrm>
-            <a:off x="4601112" y="5455268"/>
+            <a:off x="4823851" y="5455268"/>
             <a:ext cx="1060973" cy="1060973"/>
           </a:xfrm>
           <a:prstGeom prst="rect">
@@ -3356,7 +3309,7 @@
           <p:nvPr/>
         </p:nvPicPr>
         <p:blipFill>
-          <a:blip r:embed="rId7">
+          <a:blip r:embed="rId6">
             <a:extLst>
               <a:ext uri="{28A0092B-C50C-407E-A947-70E740481C1C}">
                 <a14:useLocalDpi xmlns:a14="http://schemas.microsoft.com/office/drawing/2010/main" val="0"/>
@@ -3370,48 +3323,7 @@
         </p:blipFill>
         <p:spPr bwMode="auto">
           <a:xfrm>
-            <a:off x="5714807" y="5455268"/>
-            <a:ext cx="1060973" cy="1060973"/>
-          </a:xfrm>
-          <a:prstGeom prst="rect">
-            <a:avLst/>
-          </a:prstGeom>
-          <a:noFill/>
-          <a:extLst>
-            <a:ext uri="{909E8E84-426E-40DD-AFC4-6F175D3DCCD1}">
-              <a14:hiddenFill xmlns:a14="http://schemas.microsoft.com/office/drawing/2010/main">
-                <a:solidFill>
-                  <a:srgbClr val="FFFFFF"/>
-                </a:solidFill>
-              </a14:hiddenFill>
-            </a:ext>
-          </a:extLst>
-        </p:spPr>
-      </p:pic>
-      <p:pic>
-        <p:nvPicPr>
-          <p:cNvPr id="1032" name="Picture 8" descr="C:\cygwin64\home\Emi\cardbord\room-tour\qr\hardbruecke.png"/>
-          <p:cNvPicPr>
-            <a:picLocks noChangeAspect="1" noChangeArrowheads="1"/>
-          </p:cNvPicPr>
-          <p:nvPr/>
-        </p:nvPicPr>
-        <p:blipFill>
-          <a:blip r:embed="rId8">
-            <a:extLst>
-              <a:ext uri="{28A0092B-C50C-407E-A947-70E740481C1C}">
-                <a14:useLocalDpi xmlns:a14="http://schemas.microsoft.com/office/drawing/2010/main" val="0"/>
-              </a:ext>
-            </a:extLst>
-          </a:blip>
-          <a:srcRect/>
-          <a:stretch>
-            <a:fillRect/>
-          </a:stretch>
-        </p:blipFill>
-        <p:spPr bwMode="auto">
-          <a:xfrm>
-            <a:off x="6828502" y="5455268"/>
+            <a:off x="6383024" y="5455268"/>
             <a:ext cx="1060973" cy="1060973"/>
           </a:xfrm>
           <a:prstGeom prst="rect">
@@ -3438,7 +3350,7 @@
           <p:nvPr/>
         </p:nvPicPr>
         <p:blipFill>
-          <a:blip r:embed="rId9">
+          <a:blip r:embed="rId7">
             <a:extLst>
               <a:ext uri="{28A0092B-C50C-407E-A947-70E740481C1C}">
                 <a14:useLocalDpi xmlns:a14="http://schemas.microsoft.com/office/drawing/2010/main" val="0"/>
@@ -3479,7 +3391,7 @@
           <p:nvPr/>
         </p:nvPicPr>
         <p:blipFill>
-          <a:blip r:embed="rId10">
+          <a:blip r:embed="rId8">
             <a:extLst>
               <a:ext uri="{28A0092B-C50C-407E-A947-70E740481C1C}">
                 <a14:useLocalDpi xmlns:a14="http://schemas.microsoft.com/office/drawing/2010/main" val="0"/>
@@ -3521,6 +3433,13 @@
   <p:clrMapOvr>
     <a:masterClrMapping/>
   </p:clrMapOvr>
+  <p:timing>
+    <p:tnLst>
+      <p:par>
+        <p:cTn id="1" dur="indefinite" restart="never" nodeType="tmRoot"/>
+      </p:par>
+    </p:tnLst>
+  </p:timing>
 </p:sld>
 </file>
 

</xml_diff>